<commit_message>
Update H01 and M02
</commit_message>
<xml_diff>
--- a/M02_Algoritmos_de_ordenamiento_y_busqueda/01 Presentacion/MOD2-Ordenamiento_y_Busqueda.pptx
+++ b/M02_Algoritmos_de_ordenamiento_y_busqueda/01 Presentacion/MOD2-Ordenamiento_y_Busqueda.pptx
@@ -6,7 +6,7 @@
     <p:sldMasterId id="2147483913" r:id="rId2"/>
   </p:sldMasterIdLst>
   <p:notesMasterIdLst>
-    <p:notesMasterId r:id="rId28"/>
+    <p:notesMasterId r:id="rId29"/>
   </p:notesMasterIdLst>
   <p:sldIdLst>
     <p:sldId id="256" r:id="rId3"/>
@@ -18,22 +18,23 @@
     <p:sldId id="327" r:id="rId9"/>
     <p:sldId id="278" r:id="rId10"/>
     <p:sldId id="329" r:id="rId11"/>
-    <p:sldId id="330" r:id="rId12"/>
-    <p:sldId id="276" r:id="rId13"/>
-    <p:sldId id="307" r:id="rId14"/>
-    <p:sldId id="308" r:id="rId15"/>
-    <p:sldId id="331" r:id="rId16"/>
-    <p:sldId id="309" r:id="rId17"/>
-    <p:sldId id="277" r:id="rId18"/>
-    <p:sldId id="335" r:id="rId19"/>
-    <p:sldId id="320" r:id="rId20"/>
-    <p:sldId id="321" r:id="rId21"/>
-    <p:sldId id="322" r:id="rId22"/>
-    <p:sldId id="323" r:id="rId23"/>
-    <p:sldId id="332" r:id="rId24"/>
-    <p:sldId id="336" r:id="rId25"/>
-    <p:sldId id="337" r:id="rId26"/>
-    <p:sldId id="333" r:id="rId27"/>
+    <p:sldId id="338" r:id="rId12"/>
+    <p:sldId id="330" r:id="rId13"/>
+    <p:sldId id="276" r:id="rId14"/>
+    <p:sldId id="307" r:id="rId15"/>
+    <p:sldId id="308" r:id="rId16"/>
+    <p:sldId id="331" r:id="rId17"/>
+    <p:sldId id="309" r:id="rId18"/>
+    <p:sldId id="277" r:id="rId19"/>
+    <p:sldId id="335" r:id="rId20"/>
+    <p:sldId id="320" r:id="rId21"/>
+    <p:sldId id="321" r:id="rId22"/>
+    <p:sldId id="322" r:id="rId23"/>
+    <p:sldId id="323" r:id="rId24"/>
+    <p:sldId id="332" r:id="rId25"/>
+    <p:sldId id="336" r:id="rId26"/>
+    <p:sldId id="337" r:id="rId27"/>
+    <p:sldId id="333" r:id="rId28"/>
   </p:sldIdLst>
   <p:sldSz cx="9144000" cy="6858000" type="screen4x3"/>
   <p:notesSz cx="6858000" cy="9144000"/>
@@ -263,7 +264,7 @@
           <a:p>
             <a:fld id="{502DC4F2-4218-4162-BA3D-B14DE8F619FF}" type="datetimeFigureOut">
               <a:rPr lang="en-US" smtClean="0"/>
-              <a:t>1/28/2020</a:t>
+              <a:t>1/21/2021</a:t>
             </a:fld>
             <a:endParaRPr lang="en-US"/>
           </a:p>
@@ -595,7 +596,7 @@
           <a:p>
             <a:fld id="{BD8656B0-F731-4880-84A4-483AAA08A66D}" type="slidenum">
               <a:rPr lang="en-US" smtClean="0"/>
-              <a:t>22</a:t>
+              <a:t>23</a:t>
             </a:fld>
             <a:endParaRPr lang="en-US"/>
           </a:p>
@@ -5232,6 +5233,169 @@
           <p:cNvPr id="2" name="Title 1">
             <a:extLst>
               <a:ext uri="{FF2B5EF4-FFF2-40B4-BE49-F238E27FC236}">
+                <a16:creationId xmlns:a16="http://schemas.microsoft.com/office/drawing/2014/main" id="{EACFCE72-76C9-40B5-8E0C-20497AB178C0}"/>
+              </a:ext>
+            </a:extLst>
+          </p:cNvPr>
+          <p:cNvSpPr>
+            <a:spLocks noGrp="1"/>
+          </p:cNvSpPr>
+          <p:nvPr>
+            <p:ph type="title"/>
+          </p:nvPr>
+        </p:nvSpPr>
+        <p:spPr/>
+        <p:txBody>
+          <a:bodyPr/>
+          <a:lstStyle/>
+          <a:p>
+            <a:r>
+              <a:rPr lang="es-MX" dirty="0"/>
+              <a:t>Caso de Estudio</a:t>
+            </a:r>
+            <a:endParaRPr lang="en-US" dirty="0"/>
+          </a:p>
+        </p:txBody>
+      </p:sp>
+      <p:pic>
+        <p:nvPicPr>
+          <p:cNvPr id="10" name="Picture 9">
+            <a:extLst>
+              <a:ext uri="{FF2B5EF4-FFF2-40B4-BE49-F238E27FC236}">
+                <a16:creationId xmlns:a16="http://schemas.microsoft.com/office/drawing/2014/main" id="{B4477752-2EFF-4B7A-A93A-37EE43934AC6}"/>
+              </a:ext>
+            </a:extLst>
+          </p:cNvPr>
+          <p:cNvPicPr>
+            <a:picLocks noChangeAspect="1"/>
+          </p:cNvPicPr>
+          <p:nvPr/>
+        </p:nvPicPr>
+        <p:blipFill rotWithShape="1">
+          <a:blip r:embed="rId2"/>
+          <a:srcRect t="2073"/>
+          <a:stretch/>
+        </p:blipFill>
+        <p:spPr>
+          <a:xfrm>
+            <a:off x="486937" y="1397620"/>
+            <a:ext cx="5707349" cy="2111298"/>
+          </a:xfrm>
+          <a:prstGeom prst="rect">
+            <a:avLst/>
+          </a:prstGeom>
+        </p:spPr>
+      </p:pic>
+      <p:sp>
+        <p:nvSpPr>
+          <p:cNvPr id="11" name="TextBox 10">
+            <a:extLst>
+              <a:ext uri="{FF2B5EF4-FFF2-40B4-BE49-F238E27FC236}">
+                <a16:creationId xmlns:a16="http://schemas.microsoft.com/office/drawing/2014/main" id="{A4718022-E55C-4668-9448-DDBE523E828B}"/>
+              </a:ext>
+            </a:extLst>
+          </p:cNvPr>
+          <p:cNvSpPr txBox="1"/>
+          <p:nvPr/>
+        </p:nvSpPr>
+        <p:spPr>
+          <a:xfrm>
+            <a:off x="728546" y="4502472"/>
+            <a:ext cx="7642303" cy="1200329"/>
+          </a:xfrm>
+          <a:prstGeom prst="rect">
+            <a:avLst/>
+          </a:prstGeom>
+          <a:noFill/>
+        </p:spPr>
+        <p:txBody>
+          <a:bodyPr wrap="square" rtlCol="0">
+            <a:spAutoFit/>
+          </a:bodyPr>
+          <a:lstStyle/>
+          <a:p>
+            <a:r>
+              <a:rPr lang="es-MX" dirty="0"/>
+              <a:t>Diseña un método que reciba un arreglo con los precios que ha tenido un producto en Amazon en los últimos días. </a:t>
+            </a:r>
+          </a:p>
+          <a:p>
+            <a:endParaRPr lang="es-MX" dirty="0"/>
+          </a:p>
+          <a:p>
+            <a:r>
+              <a:rPr lang="es-MX" dirty="0"/>
+              <a:t>Posteriormente, regresa el precio más bajo que tuvo el producto</a:t>
+            </a:r>
+            <a:endParaRPr lang="en-US" dirty="0"/>
+          </a:p>
+        </p:txBody>
+      </p:sp>
+      <p:pic>
+        <p:nvPicPr>
+          <p:cNvPr id="12" name="Picture 11">
+            <a:extLst>
+              <a:ext uri="{FF2B5EF4-FFF2-40B4-BE49-F238E27FC236}">
+                <a16:creationId xmlns:a16="http://schemas.microsoft.com/office/drawing/2014/main" id="{C79AF541-C35E-44A0-8096-732C5E37F1C0}"/>
+              </a:ext>
+            </a:extLst>
+          </p:cNvPr>
+          <p:cNvPicPr>
+            <a:picLocks noChangeAspect="1"/>
+          </p:cNvPicPr>
+          <p:nvPr/>
+        </p:nvPicPr>
+        <p:blipFill>
+          <a:blip r:embed="rId3"/>
+          <a:stretch>
+            <a:fillRect/>
+          </a:stretch>
+        </p:blipFill>
+        <p:spPr>
+          <a:xfrm>
+            <a:off x="6404107" y="1616131"/>
+            <a:ext cx="2650683" cy="1562761"/>
+          </a:xfrm>
+          <a:prstGeom prst="rect">
+            <a:avLst/>
+          </a:prstGeom>
+        </p:spPr>
+      </p:pic>
+    </p:spTree>
+    <p:extLst>
+      <p:ext uri="{BB962C8B-B14F-4D97-AF65-F5344CB8AC3E}">
+        <p14:creationId xmlns:p14="http://schemas.microsoft.com/office/powerpoint/2010/main" val="2512662489"/>
+      </p:ext>
+    </p:extLst>
+  </p:cSld>
+  <p:clrMapOvr>
+    <a:masterClrMapping/>
+  </p:clrMapOvr>
+</p:sld>
+</file>
+
+<file path=ppt/slides/slide11.xml><?xml version="1.0" encoding="utf-8"?>
+<p:sld xmlns:a="http://schemas.openxmlformats.org/drawingml/2006/main" xmlns:r="http://schemas.openxmlformats.org/officeDocument/2006/relationships" xmlns:p="http://schemas.openxmlformats.org/presentationml/2006/main">
+  <p:cSld>
+    <p:spTree>
+      <p:nvGrpSpPr>
+        <p:cNvPr id="1" name=""/>
+        <p:cNvGrpSpPr/>
+        <p:nvPr/>
+      </p:nvGrpSpPr>
+      <p:grpSpPr>
+        <a:xfrm>
+          <a:off x="0" y="0"/>
+          <a:ext cx="0" cy="0"/>
+          <a:chOff x="0" y="0"/>
+          <a:chExt cx="0" cy="0"/>
+        </a:xfrm>
+      </p:grpSpPr>
+      <p:sp>
+        <p:nvSpPr>
+          <p:cNvPr id="2" name="Title 1">
+            <a:extLst>
+              <a:ext uri="{FF2B5EF4-FFF2-40B4-BE49-F238E27FC236}">
                 <a16:creationId xmlns:a16="http://schemas.microsoft.com/office/drawing/2014/main" id="{44920252-09A0-4871-A977-DEA3C237BE3C}"/>
               </a:ext>
             </a:extLst>
@@ -5451,7 +5615,7 @@
 </p:sld>
 </file>
 
-<file path=ppt/slides/slide11.xml><?xml version="1.0" encoding="utf-8"?>
+<file path=ppt/slides/slide12.xml><?xml version="1.0" encoding="utf-8"?>
 <p:sld xmlns:a="http://schemas.openxmlformats.org/drawingml/2006/main" xmlns:r="http://schemas.openxmlformats.org/officeDocument/2006/relationships" xmlns:p="http://schemas.openxmlformats.org/presentationml/2006/main">
   <p:cSld>
     <p:spTree>
@@ -5546,7 +5710,7 @@
 </p:sld>
 </file>
 
-<file path=ppt/slides/slide12.xml><?xml version="1.0" encoding="utf-8"?>
+<file path=ppt/slides/slide13.xml><?xml version="1.0" encoding="utf-8"?>
 <p:sld xmlns:a="http://schemas.openxmlformats.org/drawingml/2006/main" xmlns:r="http://schemas.openxmlformats.org/officeDocument/2006/relationships" xmlns:p="http://schemas.openxmlformats.org/presentationml/2006/main">
   <p:cSld>
     <p:spTree>
@@ -5671,7 +5835,7 @@
 </p:sld>
 </file>
 
-<file path=ppt/slides/slide13.xml><?xml version="1.0" encoding="utf-8"?>
+<file path=ppt/slides/slide14.xml><?xml version="1.0" encoding="utf-8"?>
 <p:sld xmlns:a="http://schemas.openxmlformats.org/drawingml/2006/main" xmlns:r="http://schemas.openxmlformats.org/officeDocument/2006/relationships" xmlns:p="http://schemas.openxmlformats.org/presentationml/2006/main">
   <p:cSld>
     <p:spTree>
@@ -5979,7 +6143,7 @@
 </p:sld>
 </file>
 
-<file path=ppt/slides/slide14.xml><?xml version="1.0" encoding="utf-8"?>
+<file path=ppt/slides/slide15.xml><?xml version="1.0" encoding="utf-8"?>
 <p:sld xmlns:a="http://schemas.openxmlformats.org/drawingml/2006/main" xmlns:r="http://schemas.openxmlformats.org/officeDocument/2006/relationships" xmlns:p="http://schemas.openxmlformats.org/presentationml/2006/main">
   <p:cSld>
     <p:spTree>
@@ -6056,7 +6220,7 @@
 </p:sld>
 </file>
 
-<file path=ppt/slides/slide15.xml><?xml version="1.0" encoding="utf-8"?>
+<file path=ppt/slides/slide16.xml><?xml version="1.0" encoding="utf-8"?>
 <p:sld xmlns:a="http://schemas.openxmlformats.org/drawingml/2006/main" xmlns:r="http://schemas.openxmlformats.org/officeDocument/2006/relationships" xmlns:p="http://schemas.openxmlformats.org/presentationml/2006/main">
   <p:cSld>
     <p:spTree>
@@ -8062,7 +8226,7 @@
 </p:sld>
 </file>
 
-<file path=ppt/slides/slide16.xml><?xml version="1.0" encoding="utf-8"?>
+<file path=ppt/slides/slide17.xml><?xml version="1.0" encoding="utf-8"?>
 <p:sld xmlns:a="http://schemas.openxmlformats.org/drawingml/2006/main" xmlns:r="http://schemas.openxmlformats.org/officeDocument/2006/relationships" xmlns:p="http://schemas.openxmlformats.org/presentationml/2006/main">
   <p:cSld>
     <p:spTree>
@@ -8738,7 +8902,7 @@
 </p:sld>
 </file>
 
-<file path=ppt/slides/slide17.xml><?xml version="1.0" encoding="utf-8"?>
+<file path=ppt/slides/slide18.xml><?xml version="1.0" encoding="utf-8"?>
 <p:sld xmlns:a="http://schemas.openxmlformats.org/drawingml/2006/main" xmlns:r="http://schemas.openxmlformats.org/officeDocument/2006/relationships" xmlns:p="http://schemas.openxmlformats.org/presentationml/2006/main">
   <p:cSld>
     <p:spTree>
@@ -8967,7 +9131,7 @@
 </p:sld>
 </file>
 
-<file path=ppt/slides/slide18.xml><?xml version="1.0" encoding="utf-8"?>
+<file path=ppt/slides/slide19.xml><?xml version="1.0" encoding="utf-8"?>
 <p:sld xmlns:a="http://schemas.openxmlformats.org/drawingml/2006/main" xmlns:r="http://schemas.openxmlformats.org/officeDocument/2006/relationships" xmlns:p="http://schemas.openxmlformats.org/presentationml/2006/main">
   <p:cSld>
     <p:spTree>
@@ -9099,7 +9263,340 @@
 </p:sld>
 </file>
 
-<file path=ppt/slides/slide19.xml><?xml version="1.0" encoding="utf-8"?>
+<file path=ppt/slides/slide2.xml><?xml version="1.0" encoding="utf-8"?>
+<p:sld xmlns:a="http://schemas.openxmlformats.org/drawingml/2006/main" xmlns:r="http://schemas.openxmlformats.org/officeDocument/2006/relationships" xmlns:p="http://schemas.openxmlformats.org/presentationml/2006/main">
+  <p:cSld>
+    <p:spTree>
+      <p:nvGrpSpPr>
+        <p:cNvPr id="1" name=""/>
+        <p:cNvGrpSpPr/>
+        <p:nvPr/>
+      </p:nvGrpSpPr>
+      <p:grpSpPr>
+        <a:xfrm>
+          <a:off x="0" y="0"/>
+          <a:ext cx="0" cy="0"/>
+          <a:chOff x="0" y="0"/>
+          <a:chExt cx="0" cy="0"/>
+        </a:xfrm>
+      </p:grpSpPr>
+      <p:sp>
+        <p:nvSpPr>
+          <p:cNvPr id="40962" name="Title 1"/>
+          <p:cNvSpPr>
+            <a:spLocks noGrp="1"/>
+          </p:cNvSpPr>
+          <p:nvPr>
+            <p:ph type="title"/>
+          </p:nvPr>
+        </p:nvSpPr>
+        <p:spPr/>
+        <p:txBody>
+          <a:bodyPr/>
+          <a:lstStyle/>
+          <a:p>
+            <a:pPr eaLnBrk="1" hangingPunct="1"/>
+            <a:r>
+              <a:rPr lang="en-US" altLang="en-US" dirty="0" err="1"/>
+              <a:t>Arreglos</a:t>
+            </a:r>
+            <a:r>
+              <a:rPr lang="en-US" altLang="en-US" dirty="0"/>
+              <a:t> </a:t>
+            </a:r>
+            <a:r>
+              <a:rPr lang="en-US" altLang="en-US" dirty="0" err="1"/>
+              <a:t>Parciales</a:t>
+            </a:r>
+            <a:endParaRPr lang="en-US" altLang="en-US" dirty="0"/>
+          </a:p>
+        </p:txBody>
+      </p:sp>
+      <p:sp>
+        <p:nvSpPr>
+          <p:cNvPr id="40963" name="Content Placeholder 2"/>
+          <p:cNvSpPr>
+            <a:spLocks noGrp="1"/>
+          </p:cNvSpPr>
+          <p:nvPr>
+            <p:ph idx="1"/>
+          </p:nvPr>
+        </p:nvSpPr>
+        <p:spPr/>
+        <p:txBody>
+          <a:bodyPr/>
+          <a:lstStyle/>
+          <a:p>
+            <a:pPr eaLnBrk="1" hangingPunct="1"/>
+            <a:r>
+              <a:rPr lang="en-US" altLang="en-US" dirty="0"/>
+              <a:t>El </a:t>
+            </a:r>
+            <a:r>
+              <a:rPr lang="en-US" altLang="en-US" dirty="0" err="1"/>
+              <a:t>tamaño</a:t>
+            </a:r>
+            <a:r>
+              <a:rPr lang="en-US" altLang="en-US" dirty="0"/>
+              <a:t> de un </a:t>
+            </a:r>
+            <a:r>
+              <a:rPr lang="en-US" altLang="en-US" dirty="0" err="1"/>
+              <a:t>arreglo</a:t>
+            </a:r>
+            <a:r>
+              <a:rPr lang="en-US" altLang="en-US" dirty="0"/>
+              <a:t> se </a:t>
+            </a:r>
+            <a:r>
+              <a:rPr lang="en-US" altLang="en-US" dirty="0" err="1"/>
+              <a:t>especifica</a:t>
+            </a:r>
+            <a:r>
+              <a:rPr lang="en-US" altLang="en-US" dirty="0"/>
+              <a:t> </a:t>
+            </a:r>
+            <a:r>
+              <a:rPr lang="en-US" altLang="en-US" dirty="0" err="1"/>
+              <a:t>desde</a:t>
+            </a:r>
+            <a:r>
+              <a:rPr lang="en-US" altLang="en-US" dirty="0"/>
+              <a:t> la </a:t>
+            </a:r>
+            <a:r>
+              <a:rPr lang="en-US" altLang="en-US" dirty="0" err="1"/>
+              <a:t>definición</a:t>
+            </a:r>
+            <a:r>
+              <a:rPr lang="en-US" altLang="en-US" dirty="0"/>
+              <a:t>.</a:t>
+            </a:r>
+          </a:p>
+          <a:p>
+            <a:pPr eaLnBrk="1" hangingPunct="1"/>
+            <a:r>
+              <a:rPr lang="en-US" altLang="en-US" dirty="0"/>
+              <a:t>No </a:t>
+            </a:r>
+            <a:r>
+              <a:rPr lang="en-US" altLang="en-US" dirty="0" err="1"/>
+              <a:t>todos</a:t>
+            </a:r>
+            <a:r>
+              <a:rPr lang="en-US" altLang="en-US" dirty="0"/>
+              <a:t> los </a:t>
+            </a:r>
+            <a:r>
+              <a:rPr lang="en-US" altLang="en-US" dirty="0" err="1"/>
+              <a:t>elementos</a:t>
+            </a:r>
+            <a:r>
+              <a:rPr lang="en-US" altLang="en-US" dirty="0"/>
+              <a:t> del </a:t>
+            </a:r>
+            <a:r>
+              <a:rPr lang="en-US" altLang="en-US" dirty="0" err="1"/>
+              <a:t>arreglo</a:t>
+            </a:r>
+            <a:r>
+              <a:rPr lang="en-US" altLang="en-US" dirty="0"/>
+              <a:t> </a:t>
+            </a:r>
+            <a:r>
+              <a:rPr lang="en-US" altLang="en-US" dirty="0" err="1"/>
+              <a:t>almacenan</a:t>
+            </a:r>
+            <a:r>
+              <a:rPr lang="en-US" altLang="en-US" dirty="0"/>
+              <a:t> </a:t>
+            </a:r>
+            <a:r>
+              <a:rPr lang="en-US" altLang="en-US" dirty="0" err="1"/>
+              <a:t>algún</a:t>
+            </a:r>
+            <a:r>
+              <a:rPr lang="en-US" altLang="en-US" dirty="0"/>
+              <a:t> </a:t>
+            </a:r>
+            <a:r>
+              <a:rPr lang="en-US" altLang="en-US" dirty="0" err="1"/>
+              <a:t>contenido</a:t>
+            </a:r>
+            <a:r>
+              <a:rPr lang="en-US" altLang="en-US" dirty="0"/>
+              <a:t>.</a:t>
+            </a:r>
+          </a:p>
+          <a:p>
+            <a:pPr lvl="1" eaLnBrk="1" hangingPunct="1"/>
+            <a:r>
+              <a:rPr lang="en-US" altLang="en-US" dirty="0"/>
+              <a:t>Los </a:t>
+            </a:r>
+            <a:r>
+              <a:rPr lang="en-US" altLang="en-US" dirty="0" err="1"/>
+              <a:t>arreglos</a:t>
+            </a:r>
+            <a:r>
+              <a:rPr lang="en-US" altLang="en-US" dirty="0"/>
+              <a:t> que no </a:t>
+            </a:r>
+            <a:r>
+              <a:rPr lang="en-US" altLang="en-US" dirty="0" err="1"/>
+              <a:t>tienen</a:t>
+            </a:r>
+            <a:r>
+              <a:rPr lang="en-US" altLang="en-US" dirty="0"/>
+              <a:t> </a:t>
+            </a:r>
+            <a:r>
+              <a:rPr lang="en-US" altLang="en-US" dirty="0" err="1"/>
+              <a:t>todos</a:t>
+            </a:r>
+            <a:r>
+              <a:rPr lang="en-US" altLang="en-US" dirty="0"/>
+              <a:t> los </a:t>
+            </a:r>
+            <a:r>
+              <a:rPr lang="en-US" altLang="en-US" dirty="0" err="1"/>
+              <a:t>elementos</a:t>
+            </a:r>
+            <a:r>
+              <a:rPr lang="en-US" altLang="en-US" dirty="0"/>
+              <a:t> </a:t>
+            </a:r>
+            <a:r>
+              <a:rPr lang="en-US" altLang="en-US" dirty="0" err="1"/>
+              <a:t>ocupados</a:t>
+            </a:r>
+            <a:r>
+              <a:rPr lang="en-US" altLang="en-US" dirty="0"/>
+              <a:t> son </a:t>
+            </a:r>
+            <a:r>
+              <a:rPr lang="en-US" altLang="en-US" dirty="0" err="1"/>
+              <a:t>lladados</a:t>
+            </a:r>
+            <a:r>
+              <a:rPr lang="en-US" altLang="en-US" dirty="0"/>
+              <a:t> “partially filled arrays”, o “</a:t>
+            </a:r>
+            <a:r>
+              <a:rPr lang="en-US" altLang="en-US" dirty="0" err="1"/>
+              <a:t>arreglos</a:t>
+            </a:r>
+            <a:r>
+              <a:rPr lang="en-US" altLang="en-US" dirty="0"/>
+              <a:t> </a:t>
+            </a:r>
+            <a:r>
+              <a:rPr lang="en-US" altLang="en-US" dirty="0" err="1"/>
+              <a:t>parciales</a:t>
+            </a:r>
+            <a:r>
+              <a:rPr lang="en-US" altLang="en-US" dirty="0"/>
+              <a:t>”.</a:t>
+            </a:r>
+          </a:p>
+          <a:p>
+            <a:pPr eaLnBrk="1" hangingPunct="1"/>
+            <a:r>
+              <a:rPr lang="en-US" altLang="en-US" dirty="0"/>
+              <a:t>Es </a:t>
+            </a:r>
+            <a:r>
+              <a:rPr lang="en-US" altLang="en-US" dirty="0" err="1"/>
+              <a:t>tarea</a:t>
+            </a:r>
+            <a:r>
+              <a:rPr lang="en-US" altLang="en-US" dirty="0"/>
+              <a:t> del </a:t>
+            </a:r>
+            <a:r>
+              <a:rPr lang="en-US" altLang="en-US" dirty="0" err="1"/>
+              <a:t>programador</a:t>
+            </a:r>
+            <a:r>
+              <a:rPr lang="en-US" altLang="en-US" dirty="0"/>
+              <a:t> </a:t>
+            </a:r>
+            <a:r>
+              <a:rPr lang="en-US" altLang="en-US" dirty="0" err="1"/>
+              <a:t>llevar</a:t>
+            </a:r>
+            <a:r>
+              <a:rPr lang="en-US" altLang="en-US" dirty="0"/>
+              <a:t> un </a:t>
+            </a:r>
+            <a:r>
+              <a:rPr lang="en-US" altLang="en-US" dirty="0" err="1"/>
+              <a:t>registro</a:t>
+            </a:r>
+            <a:r>
+              <a:rPr lang="en-US" altLang="en-US" dirty="0"/>
+              <a:t> de </a:t>
+            </a:r>
+            <a:r>
+              <a:rPr lang="en-US" altLang="en-US" dirty="0" err="1"/>
+              <a:t>cuáles</a:t>
+            </a:r>
+            <a:r>
+              <a:rPr lang="en-US" altLang="en-US" dirty="0"/>
+              <a:t> </a:t>
+            </a:r>
+            <a:r>
+              <a:rPr lang="en-US" altLang="en-US" dirty="0" err="1"/>
+              <a:t>están</a:t>
+            </a:r>
+            <a:r>
+              <a:rPr lang="en-US" altLang="en-US" dirty="0"/>
+              <a:t> </a:t>
+            </a:r>
+            <a:r>
+              <a:rPr lang="en-US" altLang="en-US" dirty="0" err="1"/>
+              <a:t>llenos</a:t>
+            </a:r>
+            <a:r>
+              <a:rPr lang="en-US" altLang="en-US" dirty="0"/>
+              <a:t> y </a:t>
+            </a:r>
+            <a:r>
+              <a:rPr lang="en-US" altLang="en-US" dirty="0" err="1"/>
+              <a:t>cuáles</a:t>
+            </a:r>
+            <a:r>
+              <a:rPr lang="en-US" altLang="en-US" dirty="0"/>
+              <a:t> </a:t>
+            </a:r>
+            <a:r>
+              <a:rPr lang="en-US" altLang="en-US" dirty="0" err="1"/>
+              <a:t>están</a:t>
+            </a:r>
+            <a:r>
+              <a:rPr lang="en-US" altLang="en-US" dirty="0"/>
+              <a:t> </a:t>
+            </a:r>
+            <a:r>
+              <a:rPr lang="en-US" altLang="en-US" dirty="0" err="1"/>
+              <a:t>ocupados</a:t>
+            </a:r>
+            <a:r>
+              <a:rPr lang="en-US" altLang="en-US" dirty="0"/>
+              <a:t>.</a:t>
+            </a:r>
+          </a:p>
+        </p:txBody>
+      </p:sp>
+    </p:spTree>
+  </p:cSld>
+  <p:clrMapOvr>
+    <a:masterClrMapping/>
+  </p:clrMapOvr>
+</p:sld>
+</file>
+
+<file path=ppt/slides/slide20.xml><?xml version="1.0" encoding="utf-8"?>
 <p:sld xmlns:a="http://schemas.openxmlformats.org/drawingml/2006/main" xmlns:r="http://schemas.openxmlformats.org/officeDocument/2006/relationships" xmlns:p="http://schemas.openxmlformats.org/presentationml/2006/main">
   <p:cSld>
     <p:spTree>
@@ -9913,340 +10410,7 @@
 </p:sld>
 </file>
 
-<file path=ppt/slides/slide2.xml><?xml version="1.0" encoding="utf-8"?>
-<p:sld xmlns:a="http://schemas.openxmlformats.org/drawingml/2006/main" xmlns:r="http://schemas.openxmlformats.org/officeDocument/2006/relationships" xmlns:p="http://schemas.openxmlformats.org/presentationml/2006/main">
-  <p:cSld>
-    <p:spTree>
-      <p:nvGrpSpPr>
-        <p:cNvPr id="1" name=""/>
-        <p:cNvGrpSpPr/>
-        <p:nvPr/>
-      </p:nvGrpSpPr>
-      <p:grpSpPr>
-        <a:xfrm>
-          <a:off x="0" y="0"/>
-          <a:ext cx="0" cy="0"/>
-          <a:chOff x="0" y="0"/>
-          <a:chExt cx="0" cy="0"/>
-        </a:xfrm>
-      </p:grpSpPr>
-      <p:sp>
-        <p:nvSpPr>
-          <p:cNvPr id="40962" name="Title 1"/>
-          <p:cNvSpPr>
-            <a:spLocks noGrp="1"/>
-          </p:cNvSpPr>
-          <p:nvPr>
-            <p:ph type="title"/>
-          </p:nvPr>
-        </p:nvSpPr>
-        <p:spPr/>
-        <p:txBody>
-          <a:bodyPr/>
-          <a:lstStyle/>
-          <a:p>
-            <a:pPr eaLnBrk="1" hangingPunct="1"/>
-            <a:r>
-              <a:rPr lang="en-US" altLang="en-US" dirty="0" err="1"/>
-              <a:t>Arreglos</a:t>
-            </a:r>
-            <a:r>
-              <a:rPr lang="en-US" altLang="en-US" dirty="0"/>
-              <a:t> </a:t>
-            </a:r>
-            <a:r>
-              <a:rPr lang="en-US" altLang="en-US" dirty="0" err="1"/>
-              <a:t>Parciales</a:t>
-            </a:r>
-            <a:endParaRPr lang="en-US" altLang="en-US" dirty="0"/>
-          </a:p>
-        </p:txBody>
-      </p:sp>
-      <p:sp>
-        <p:nvSpPr>
-          <p:cNvPr id="40963" name="Content Placeholder 2"/>
-          <p:cNvSpPr>
-            <a:spLocks noGrp="1"/>
-          </p:cNvSpPr>
-          <p:nvPr>
-            <p:ph idx="1"/>
-          </p:nvPr>
-        </p:nvSpPr>
-        <p:spPr/>
-        <p:txBody>
-          <a:bodyPr/>
-          <a:lstStyle/>
-          <a:p>
-            <a:pPr eaLnBrk="1" hangingPunct="1"/>
-            <a:r>
-              <a:rPr lang="en-US" altLang="en-US" dirty="0"/>
-              <a:t>El </a:t>
-            </a:r>
-            <a:r>
-              <a:rPr lang="en-US" altLang="en-US" dirty="0" err="1"/>
-              <a:t>tamaño</a:t>
-            </a:r>
-            <a:r>
-              <a:rPr lang="en-US" altLang="en-US" dirty="0"/>
-              <a:t> de un </a:t>
-            </a:r>
-            <a:r>
-              <a:rPr lang="en-US" altLang="en-US" dirty="0" err="1"/>
-              <a:t>arreglo</a:t>
-            </a:r>
-            <a:r>
-              <a:rPr lang="en-US" altLang="en-US" dirty="0"/>
-              <a:t> se </a:t>
-            </a:r>
-            <a:r>
-              <a:rPr lang="en-US" altLang="en-US" dirty="0" err="1"/>
-              <a:t>especifica</a:t>
-            </a:r>
-            <a:r>
-              <a:rPr lang="en-US" altLang="en-US" dirty="0"/>
-              <a:t> </a:t>
-            </a:r>
-            <a:r>
-              <a:rPr lang="en-US" altLang="en-US" dirty="0" err="1"/>
-              <a:t>desde</a:t>
-            </a:r>
-            <a:r>
-              <a:rPr lang="en-US" altLang="en-US" dirty="0"/>
-              <a:t> la </a:t>
-            </a:r>
-            <a:r>
-              <a:rPr lang="en-US" altLang="en-US" dirty="0" err="1"/>
-              <a:t>definición</a:t>
-            </a:r>
-            <a:r>
-              <a:rPr lang="en-US" altLang="en-US" dirty="0"/>
-              <a:t>.</a:t>
-            </a:r>
-          </a:p>
-          <a:p>
-            <a:pPr eaLnBrk="1" hangingPunct="1"/>
-            <a:r>
-              <a:rPr lang="en-US" altLang="en-US" dirty="0"/>
-              <a:t>No </a:t>
-            </a:r>
-            <a:r>
-              <a:rPr lang="en-US" altLang="en-US" dirty="0" err="1"/>
-              <a:t>todos</a:t>
-            </a:r>
-            <a:r>
-              <a:rPr lang="en-US" altLang="en-US" dirty="0"/>
-              <a:t> los </a:t>
-            </a:r>
-            <a:r>
-              <a:rPr lang="en-US" altLang="en-US" dirty="0" err="1"/>
-              <a:t>elementos</a:t>
-            </a:r>
-            <a:r>
-              <a:rPr lang="en-US" altLang="en-US" dirty="0"/>
-              <a:t> del </a:t>
-            </a:r>
-            <a:r>
-              <a:rPr lang="en-US" altLang="en-US" dirty="0" err="1"/>
-              <a:t>arreglo</a:t>
-            </a:r>
-            <a:r>
-              <a:rPr lang="en-US" altLang="en-US" dirty="0"/>
-              <a:t> </a:t>
-            </a:r>
-            <a:r>
-              <a:rPr lang="en-US" altLang="en-US" dirty="0" err="1"/>
-              <a:t>almacenan</a:t>
-            </a:r>
-            <a:r>
-              <a:rPr lang="en-US" altLang="en-US" dirty="0"/>
-              <a:t> </a:t>
-            </a:r>
-            <a:r>
-              <a:rPr lang="en-US" altLang="en-US" dirty="0" err="1"/>
-              <a:t>algún</a:t>
-            </a:r>
-            <a:r>
-              <a:rPr lang="en-US" altLang="en-US" dirty="0"/>
-              <a:t> </a:t>
-            </a:r>
-            <a:r>
-              <a:rPr lang="en-US" altLang="en-US" dirty="0" err="1"/>
-              <a:t>contenido</a:t>
-            </a:r>
-            <a:r>
-              <a:rPr lang="en-US" altLang="en-US" dirty="0"/>
-              <a:t>.</a:t>
-            </a:r>
-          </a:p>
-          <a:p>
-            <a:pPr lvl="1" eaLnBrk="1" hangingPunct="1"/>
-            <a:r>
-              <a:rPr lang="en-US" altLang="en-US" dirty="0"/>
-              <a:t>Los </a:t>
-            </a:r>
-            <a:r>
-              <a:rPr lang="en-US" altLang="en-US" dirty="0" err="1"/>
-              <a:t>arreglos</a:t>
-            </a:r>
-            <a:r>
-              <a:rPr lang="en-US" altLang="en-US" dirty="0"/>
-              <a:t> que no </a:t>
-            </a:r>
-            <a:r>
-              <a:rPr lang="en-US" altLang="en-US" dirty="0" err="1"/>
-              <a:t>tienen</a:t>
-            </a:r>
-            <a:r>
-              <a:rPr lang="en-US" altLang="en-US" dirty="0"/>
-              <a:t> </a:t>
-            </a:r>
-            <a:r>
-              <a:rPr lang="en-US" altLang="en-US" dirty="0" err="1"/>
-              <a:t>todos</a:t>
-            </a:r>
-            <a:r>
-              <a:rPr lang="en-US" altLang="en-US" dirty="0"/>
-              <a:t> los </a:t>
-            </a:r>
-            <a:r>
-              <a:rPr lang="en-US" altLang="en-US" dirty="0" err="1"/>
-              <a:t>elementos</a:t>
-            </a:r>
-            <a:r>
-              <a:rPr lang="en-US" altLang="en-US" dirty="0"/>
-              <a:t> </a:t>
-            </a:r>
-            <a:r>
-              <a:rPr lang="en-US" altLang="en-US" dirty="0" err="1"/>
-              <a:t>ocupados</a:t>
-            </a:r>
-            <a:r>
-              <a:rPr lang="en-US" altLang="en-US" dirty="0"/>
-              <a:t> son </a:t>
-            </a:r>
-            <a:r>
-              <a:rPr lang="en-US" altLang="en-US" dirty="0" err="1"/>
-              <a:t>lladados</a:t>
-            </a:r>
-            <a:r>
-              <a:rPr lang="en-US" altLang="en-US" dirty="0"/>
-              <a:t> “partially filled arrays”, o “</a:t>
-            </a:r>
-            <a:r>
-              <a:rPr lang="en-US" altLang="en-US" dirty="0" err="1"/>
-              <a:t>arreglos</a:t>
-            </a:r>
-            <a:r>
-              <a:rPr lang="en-US" altLang="en-US" dirty="0"/>
-              <a:t> </a:t>
-            </a:r>
-            <a:r>
-              <a:rPr lang="en-US" altLang="en-US" dirty="0" err="1"/>
-              <a:t>parciales</a:t>
-            </a:r>
-            <a:r>
-              <a:rPr lang="en-US" altLang="en-US" dirty="0"/>
-              <a:t>”.</a:t>
-            </a:r>
-          </a:p>
-          <a:p>
-            <a:pPr eaLnBrk="1" hangingPunct="1"/>
-            <a:r>
-              <a:rPr lang="en-US" altLang="en-US" dirty="0"/>
-              <a:t>Es </a:t>
-            </a:r>
-            <a:r>
-              <a:rPr lang="en-US" altLang="en-US" dirty="0" err="1"/>
-              <a:t>tarea</a:t>
-            </a:r>
-            <a:r>
-              <a:rPr lang="en-US" altLang="en-US" dirty="0"/>
-              <a:t> del </a:t>
-            </a:r>
-            <a:r>
-              <a:rPr lang="en-US" altLang="en-US" dirty="0" err="1"/>
-              <a:t>programador</a:t>
-            </a:r>
-            <a:r>
-              <a:rPr lang="en-US" altLang="en-US" dirty="0"/>
-              <a:t> </a:t>
-            </a:r>
-            <a:r>
-              <a:rPr lang="en-US" altLang="en-US" dirty="0" err="1"/>
-              <a:t>llevar</a:t>
-            </a:r>
-            <a:r>
-              <a:rPr lang="en-US" altLang="en-US" dirty="0"/>
-              <a:t> un </a:t>
-            </a:r>
-            <a:r>
-              <a:rPr lang="en-US" altLang="en-US" dirty="0" err="1"/>
-              <a:t>registro</a:t>
-            </a:r>
-            <a:r>
-              <a:rPr lang="en-US" altLang="en-US" dirty="0"/>
-              <a:t> de </a:t>
-            </a:r>
-            <a:r>
-              <a:rPr lang="en-US" altLang="en-US" dirty="0" err="1"/>
-              <a:t>cuáles</a:t>
-            </a:r>
-            <a:r>
-              <a:rPr lang="en-US" altLang="en-US" dirty="0"/>
-              <a:t> </a:t>
-            </a:r>
-            <a:r>
-              <a:rPr lang="en-US" altLang="en-US" dirty="0" err="1"/>
-              <a:t>están</a:t>
-            </a:r>
-            <a:r>
-              <a:rPr lang="en-US" altLang="en-US" dirty="0"/>
-              <a:t> </a:t>
-            </a:r>
-            <a:r>
-              <a:rPr lang="en-US" altLang="en-US" dirty="0" err="1"/>
-              <a:t>llenos</a:t>
-            </a:r>
-            <a:r>
-              <a:rPr lang="en-US" altLang="en-US" dirty="0"/>
-              <a:t> y </a:t>
-            </a:r>
-            <a:r>
-              <a:rPr lang="en-US" altLang="en-US" dirty="0" err="1"/>
-              <a:t>cuáles</a:t>
-            </a:r>
-            <a:r>
-              <a:rPr lang="en-US" altLang="en-US" dirty="0"/>
-              <a:t> </a:t>
-            </a:r>
-            <a:r>
-              <a:rPr lang="en-US" altLang="en-US" dirty="0" err="1"/>
-              <a:t>están</a:t>
-            </a:r>
-            <a:r>
-              <a:rPr lang="en-US" altLang="en-US" dirty="0"/>
-              <a:t> </a:t>
-            </a:r>
-            <a:r>
-              <a:rPr lang="en-US" altLang="en-US" dirty="0" err="1"/>
-              <a:t>ocupados</a:t>
-            </a:r>
-            <a:r>
-              <a:rPr lang="en-US" altLang="en-US" dirty="0"/>
-              <a:t>.</a:t>
-            </a:r>
-          </a:p>
-        </p:txBody>
-      </p:sp>
-    </p:spTree>
-  </p:cSld>
-  <p:clrMapOvr>
-    <a:masterClrMapping/>
-  </p:clrMapOvr>
-</p:sld>
-</file>
-
-<file path=ppt/slides/slide20.xml><?xml version="1.0" encoding="utf-8"?>
+<file path=ppt/slides/slide21.xml><?xml version="1.0" encoding="utf-8"?>
 <p:sld xmlns:a="http://schemas.openxmlformats.org/drawingml/2006/main" xmlns:r="http://schemas.openxmlformats.org/officeDocument/2006/relationships" xmlns:p="http://schemas.openxmlformats.org/presentationml/2006/main">
   <p:cSld>
     <p:spTree>
@@ -10899,7 +11063,7 @@
 </p:sld>
 </file>
 
-<file path=ppt/slides/slide21.xml><?xml version="1.0" encoding="utf-8"?>
+<file path=ppt/slides/slide22.xml><?xml version="1.0" encoding="utf-8"?>
 <p:sld xmlns:a="http://schemas.openxmlformats.org/drawingml/2006/main" xmlns:r="http://schemas.openxmlformats.org/officeDocument/2006/relationships" xmlns:p="http://schemas.openxmlformats.org/presentationml/2006/main">
   <p:cSld>
     <p:spTree>
@@ -11639,7 +11803,7 @@
 </p:sld>
 </file>
 
-<file path=ppt/slides/slide22.xml><?xml version="1.0" encoding="utf-8"?>
+<file path=ppt/slides/slide23.xml><?xml version="1.0" encoding="utf-8"?>
 <p:sld xmlns:a="http://schemas.openxmlformats.org/drawingml/2006/main" xmlns:r="http://schemas.openxmlformats.org/officeDocument/2006/relationships" xmlns:p="http://schemas.openxmlformats.org/presentationml/2006/main">
   <p:cSld>
     <p:spTree>
@@ -11716,7 +11880,7 @@
 </p:sld>
 </file>
 
-<file path=ppt/slides/slide23.xml><?xml version="1.0" encoding="utf-8"?>
+<file path=ppt/slides/slide24.xml><?xml version="1.0" encoding="utf-8"?>
 <p:sld xmlns:a="http://schemas.openxmlformats.org/drawingml/2006/main" xmlns:r="http://schemas.openxmlformats.org/officeDocument/2006/relationships" xmlns:p="http://schemas.openxmlformats.org/presentationml/2006/main">
   <p:cSld>
     <p:spTree>
@@ -13872,7 +14036,7 @@
 </p:sld>
 </file>
 
-<file path=ppt/slides/slide24.xml><?xml version="1.0" encoding="utf-8"?>
+<file path=ppt/slides/slide25.xml><?xml version="1.0" encoding="utf-8"?>
 <p:sld xmlns:a="http://schemas.openxmlformats.org/drawingml/2006/main" xmlns:r="http://schemas.openxmlformats.org/officeDocument/2006/relationships" xmlns:p="http://schemas.openxmlformats.org/presentationml/2006/main">
   <p:cSld>
     <p:spTree>
@@ -14472,7 +14636,7 @@
 </p:sld>
 </file>
 
-<file path=ppt/slides/slide25.xml><?xml version="1.0" encoding="utf-8"?>
+<file path=ppt/slides/slide26.xml><?xml version="1.0" encoding="utf-8"?>
 <p:sld xmlns:a="http://schemas.openxmlformats.org/drawingml/2006/main" xmlns:r="http://schemas.openxmlformats.org/officeDocument/2006/relationships" xmlns:p="http://schemas.openxmlformats.org/presentationml/2006/main">
   <p:cSld>
     <p:spTree>

</xml_diff>